<commit_message>
localization & callback forum
</commit_message>
<xml_diff>
--- a/sistemka.pptx
+++ b/sistemka.pptx
@@ -262,7 +262,7 @@
           <a:p>
             <a:fld id="{6359FC7E-B0AC-42BA-B42D-2E395D864C9D}" type="datetimeFigureOut">
               <a:rPr lang="uz-Latn-UZ" smtClean="0"/>
-              <a:t>11/08/2025</a:t>
+              <a:t>12/08/2025</a:t>
             </a:fld>
             <a:endParaRPr lang="uz-Latn-UZ"/>
           </a:p>
@@ -462,7 +462,7 @@
           <a:p>
             <a:fld id="{6359FC7E-B0AC-42BA-B42D-2E395D864C9D}" type="datetimeFigureOut">
               <a:rPr lang="uz-Latn-UZ" smtClean="0"/>
-              <a:t>11/08/2025</a:t>
+              <a:t>12/08/2025</a:t>
             </a:fld>
             <a:endParaRPr lang="uz-Latn-UZ"/>
           </a:p>
@@ -672,7 +672,7 @@
           <a:p>
             <a:fld id="{6359FC7E-B0AC-42BA-B42D-2E395D864C9D}" type="datetimeFigureOut">
               <a:rPr lang="uz-Latn-UZ" smtClean="0"/>
-              <a:t>11/08/2025</a:t>
+              <a:t>12/08/2025</a:t>
             </a:fld>
             <a:endParaRPr lang="uz-Latn-UZ"/>
           </a:p>
@@ -872,7 +872,7 @@
           <a:p>
             <a:fld id="{6359FC7E-B0AC-42BA-B42D-2E395D864C9D}" type="datetimeFigureOut">
               <a:rPr lang="uz-Latn-UZ" smtClean="0"/>
-              <a:t>11/08/2025</a:t>
+              <a:t>12/08/2025</a:t>
             </a:fld>
             <a:endParaRPr lang="uz-Latn-UZ"/>
           </a:p>
@@ -1148,7 +1148,7 @@
           <a:p>
             <a:fld id="{6359FC7E-B0AC-42BA-B42D-2E395D864C9D}" type="datetimeFigureOut">
               <a:rPr lang="uz-Latn-UZ" smtClean="0"/>
-              <a:t>11/08/2025</a:t>
+              <a:t>12/08/2025</a:t>
             </a:fld>
             <a:endParaRPr lang="uz-Latn-UZ"/>
           </a:p>
@@ -1416,7 +1416,7 @@
           <a:p>
             <a:fld id="{6359FC7E-B0AC-42BA-B42D-2E395D864C9D}" type="datetimeFigureOut">
               <a:rPr lang="uz-Latn-UZ" smtClean="0"/>
-              <a:t>11/08/2025</a:t>
+              <a:t>12/08/2025</a:t>
             </a:fld>
             <a:endParaRPr lang="uz-Latn-UZ"/>
           </a:p>
@@ -1831,7 +1831,7 @@
           <a:p>
             <a:fld id="{6359FC7E-B0AC-42BA-B42D-2E395D864C9D}" type="datetimeFigureOut">
               <a:rPr lang="uz-Latn-UZ" smtClean="0"/>
-              <a:t>11/08/2025</a:t>
+              <a:t>12/08/2025</a:t>
             </a:fld>
             <a:endParaRPr lang="uz-Latn-UZ"/>
           </a:p>
@@ -1973,7 +1973,7 @@
           <a:p>
             <a:fld id="{6359FC7E-B0AC-42BA-B42D-2E395D864C9D}" type="datetimeFigureOut">
               <a:rPr lang="uz-Latn-UZ" smtClean="0"/>
-              <a:t>11/08/2025</a:t>
+              <a:t>12/08/2025</a:t>
             </a:fld>
             <a:endParaRPr lang="uz-Latn-UZ"/>
           </a:p>
@@ -2086,7 +2086,7 @@
           <a:p>
             <a:fld id="{6359FC7E-B0AC-42BA-B42D-2E395D864C9D}" type="datetimeFigureOut">
               <a:rPr lang="uz-Latn-UZ" smtClean="0"/>
-              <a:t>11/08/2025</a:t>
+              <a:t>12/08/2025</a:t>
             </a:fld>
             <a:endParaRPr lang="uz-Latn-UZ"/>
           </a:p>
@@ -2399,7 +2399,7 @@
           <a:p>
             <a:fld id="{6359FC7E-B0AC-42BA-B42D-2E395D864C9D}" type="datetimeFigureOut">
               <a:rPr lang="uz-Latn-UZ" smtClean="0"/>
-              <a:t>11/08/2025</a:t>
+              <a:t>12/08/2025</a:t>
             </a:fld>
             <a:endParaRPr lang="uz-Latn-UZ"/>
           </a:p>
@@ -2688,7 +2688,7 @@
           <a:p>
             <a:fld id="{6359FC7E-B0AC-42BA-B42D-2E395D864C9D}" type="datetimeFigureOut">
               <a:rPr lang="uz-Latn-UZ" smtClean="0"/>
-              <a:t>11/08/2025</a:t>
+              <a:t>12/08/2025</a:t>
             </a:fld>
             <a:endParaRPr lang="uz-Latn-UZ"/>
           </a:p>
@@ -2931,7 +2931,7 @@
           <a:p>
             <a:fld id="{6359FC7E-B0AC-42BA-B42D-2E395D864C9D}" type="datetimeFigureOut">
               <a:rPr lang="uz-Latn-UZ" smtClean="0"/>
-              <a:t>11/08/2025</a:t>
+              <a:t>12/08/2025</a:t>
             </a:fld>
             <a:endParaRPr lang="uz-Latn-UZ"/>
           </a:p>
@@ -3954,10 +3954,10 @@
       </p:grpSp>
       <p:grpSp>
         <p:nvGrpSpPr>
-          <p:cNvPr id="11" name="Группа 10">
-            <a:extLst>
-              <a:ext uri="{FF2B5EF4-FFF2-40B4-BE49-F238E27FC236}">
-                <a16:creationId xmlns:a16="http://schemas.microsoft.com/office/drawing/2014/main" id="{7DA08E74-7097-0E56-CCC6-0822F0D4D4DF}"/>
+          <p:cNvPr id="25" name="Группа 24">
+            <a:extLst>
+              <a:ext uri="{FF2B5EF4-FFF2-40B4-BE49-F238E27FC236}">
+                <a16:creationId xmlns:a16="http://schemas.microsoft.com/office/drawing/2014/main" id="{C693FC6C-300A-7DF4-8973-3033CA18B10D}"/>
               </a:ext>
             </a:extLst>
           </p:cNvPr>
@@ -3966,10 +3966,10 @@
         </p:nvGrpSpPr>
         <p:grpSpPr>
           <a:xfrm>
-            <a:off x="4704626" y="468614"/>
-            <a:ext cx="4956806" cy="4940111"/>
-            <a:chOff x="4704626" y="468614"/>
-            <a:chExt cx="4956806" cy="4940111"/>
+            <a:off x="3613365" y="468614"/>
+            <a:ext cx="6320961" cy="4304422"/>
+            <a:chOff x="3613365" y="468614"/>
+            <a:chExt cx="6320961" cy="4304422"/>
           </a:xfrm>
         </p:grpSpPr>
         <p:grpSp>
@@ -3987,7 +3987,7 @@
           <p:grpSpPr>
             <a:xfrm>
               <a:off x="5368517" y="468614"/>
-              <a:ext cx="3758504" cy="3728709"/>
+              <a:ext cx="2984908" cy="2961245"/>
               <a:chOff x="5770562" y="978228"/>
               <a:chExt cx="3758504" cy="3728709"/>
             </a:xfrm>
@@ -4206,7 +4206,7 @@
               <a:lstStyle/>
               <a:p>
                 <a:pPr algn="ctr"/>
-                <a:endParaRPr lang="uz-Latn-UZ"/>
+                <a:endParaRPr lang="uz-Latn-UZ" dirty="0"/>
               </a:p>
             </p:txBody>
           </p:sp>
@@ -4429,8 +4429,8 @@
           </p:nvSpPr>
           <p:spPr>
             <a:xfrm>
-              <a:off x="5542695" y="4320820"/>
-              <a:ext cx="3430747" cy="707886"/>
+              <a:off x="4928214" y="3488394"/>
+              <a:ext cx="4073551" cy="830997"/>
             </a:xfrm>
             <a:prstGeom prst="rect">
               <a:avLst/>
@@ -4444,7 +4444,7 @@
             <a:lstStyle/>
             <a:p>
               <a:r>
-                <a:rPr lang="en-US" sz="4000" dirty="0">
+                <a:rPr lang="en-US" sz="4800" dirty="0">
                   <a:solidFill>
                     <a:srgbClr val="4940E4"/>
                   </a:solidFill>
@@ -4452,7 +4452,7 @@
                 </a:rPr>
                 <a:t>sistemka.uz</a:t>
               </a:r>
-              <a:endParaRPr lang="uz-Latn-UZ" sz="4000" dirty="0">
+              <a:endParaRPr lang="uz-Latn-UZ" sz="4800" dirty="0">
                 <a:solidFill>
                   <a:srgbClr val="4940E4"/>
                 </a:solidFill>
@@ -4475,8 +4475,8 @@
           </p:nvSpPr>
           <p:spPr>
             <a:xfrm>
-              <a:off x="4704626" y="4885505"/>
-              <a:ext cx="4956806" cy="523220"/>
+              <a:off x="3613365" y="4126705"/>
+              <a:ext cx="6320961" cy="646331"/>
             </a:xfrm>
             <a:prstGeom prst="rect">
               <a:avLst/>
@@ -4490,7 +4490,7 @@
             <a:lstStyle/>
             <a:p>
               <a:r>
-                <a:rPr lang="en-US" sz="2800" dirty="0">
+                <a:rPr lang="en-US" sz="3600" dirty="0">
                   <a:solidFill>
                     <a:srgbClr val="4940E4"/>
                   </a:solidFill>
@@ -4498,7 +4498,7 @@
                 </a:rPr>
                 <a:t>Hardware &amp; Software United</a:t>
               </a:r>
-              <a:endParaRPr lang="uz-Latn-UZ" sz="2800" dirty="0">
+              <a:endParaRPr lang="uz-Latn-UZ" sz="3600" dirty="0">
                 <a:solidFill>
                   <a:srgbClr val="4940E4"/>
                 </a:solidFill>

</xml_diff>